<commit_message>
Added some content to 3.3
title
</commit_message>
<xml_diff>
--- a/RawImageFiles/3-3-OptoMechanicalSolidWorksLayoutProfile.pptx
+++ b/RawImageFiles/3-3-OptoMechanicalSolidWorksLayoutProfile.pptx
@@ -243,7 +243,7 @@
           <a:p>
             <a:fld id="{49B85BB2-E19F-495C-8A41-653C123B6796}" type="datetimeFigureOut">
               <a:rPr lang="en-CA" smtClean="0"/>
-              <a:t>25/03/2015</a:t>
+              <a:t>01/04/2015</a:t>
             </a:fld>
             <a:endParaRPr lang="en-CA"/>
           </a:p>
@@ -413,7 +413,7 @@
           <a:p>
             <a:fld id="{49B85BB2-E19F-495C-8A41-653C123B6796}" type="datetimeFigureOut">
               <a:rPr lang="en-CA" smtClean="0"/>
-              <a:t>25/03/2015</a:t>
+              <a:t>01/04/2015</a:t>
             </a:fld>
             <a:endParaRPr lang="en-CA"/>
           </a:p>
@@ -593,7 +593,7 @@
           <a:p>
             <a:fld id="{49B85BB2-E19F-495C-8A41-653C123B6796}" type="datetimeFigureOut">
               <a:rPr lang="en-CA" smtClean="0"/>
-              <a:t>25/03/2015</a:t>
+              <a:t>01/04/2015</a:t>
             </a:fld>
             <a:endParaRPr lang="en-CA"/>
           </a:p>
@@ -763,7 +763,7 @@
           <a:p>
             <a:fld id="{49B85BB2-E19F-495C-8A41-653C123B6796}" type="datetimeFigureOut">
               <a:rPr lang="en-CA" smtClean="0"/>
-              <a:t>25/03/2015</a:t>
+              <a:t>01/04/2015</a:t>
             </a:fld>
             <a:endParaRPr lang="en-CA"/>
           </a:p>
@@ -1009,7 +1009,7 @@
           <a:p>
             <a:fld id="{49B85BB2-E19F-495C-8A41-653C123B6796}" type="datetimeFigureOut">
               <a:rPr lang="en-CA" smtClean="0"/>
-              <a:t>25/03/2015</a:t>
+              <a:t>01/04/2015</a:t>
             </a:fld>
             <a:endParaRPr lang="en-CA"/>
           </a:p>
@@ -1241,7 +1241,7 @@
           <a:p>
             <a:fld id="{49B85BB2-E19F-495C-8A41-653C123B6796}" type="datetimeFigureOut">
               <a:rPr lang="en-CA" smtClean="0"/>
-              <a:t>25/03/2015</a:t>
+              <a:t>01/04/2015</a:t>
             </a:fld>
             <a:endParaRPr lang="en-CA"/>
           </a:p>
@@ -1608,7 +1608,7 @@
           <a:p>
             <a:fld id="{49B85BB2-E19F-495C-8A41-653C123B6796}" type="datetimeFigureOut">
               <a:rPr lang="en-CA" smtClean="0"/>
-              <a:t>25/03/2015</a:t>
+              <a:t>01/04/2015</a:t>
             </a:fld>
             <a:endParaRPr lang="en-CA"/>
           </a:p>
@@ -1726,7 +1726,7 @@
           <a:p>
             <a:fld id="{49B85BB2-E19F-495C-8A41-653C123B6796}" type="datetimeFigureOut">
               <a:rPr lang="en-CA" smtClean="0"/>
-              <a:t>25/03/2015</a:t>
+              <a:t>01/04/2015</a:t>
             </a:fld>
             <a:endParaRPr lang="en-CA"/>
           </a:p>
@@ -1821,7 +1821,7 @@
           <a:p>
             <a:fld id="{49B85BB2-E19F-495C-8A41-653C123B6796}" type="datetimeFigureOut">
               <a:rPr lang="en-CA" smtClean="0"/>
-              <a:t>25/03/2015</a:t>
+              <a:t>01/04/2015</a:t>
             </a:fld>
             <a:endParaRPr lang="en-CA"/>
           </a:p>
@@ -2098,7 +2098,7 @@
           <a:p>
             <a:fld id="{49B85BB2-E19F-495C-8A41-653C123B6796}" type="datetimeFigureOut">
               <a:rPr lang="en-CA" smtClean="0"/>
-              <a:t>25/03/2015</a:t>
+              <a:t>01/04/2015</a:t>
             </a:fld>
             <a:endParaRPr lang="en-CA"/>
           </a:p>
@@ -2355,7 +2355,7 @@
           <a:p>
             <a:fld id="{49B85BB2-E19F-495C-8A41-653C123B6796}" type="datetimeFigureOut">
               <a:rPr lang="en-CA" smtClean="0"/>
-              <a:t>25/03/2015</a:t>
+              <a:t>01/04/2015</a:t>
             </a:fld>
             <a:endParaRPr lang="en-CA"/>
           </a:p>
@@ -2568,7 +2568,7 @@
           <a:p>
             <a:fld id="{49B85BB2-E19F-495C-8A41-653C123B6796}" type="datetimeFigureOut">
               <a:rPr lang="en-CA" smtClean="0"/>
-              <a:t>25/03/2015</a:t>
+              <a:t>01/04/2015</a:t>
             </a:fld>
             <a:endParaRPr lang="en-CA"/>
           </a:p>
@@ -3022,14 +3022,14 @@
           </a:ln>
         </p:spPr>
         <p:style>
-          <a:lnRef idx="1">
-            <a:schemeClr val="dk1"/>
+          <a:lnRef idx="3">
+            <a:schemeClr val="accent2"/>
           </a:lnRef>
           <a:fillRef idx="0">
-            <a:schemeClr val="dk1"/>
+            <a:schemeClr val="accent2"/>
           </a:fillRef>
-          <a:effectRef idx="0">
-            <a:schemeClr val="dk1"/>
+          <a:effectRef idx="2">
+            <a:schemeClr val="accent2"/>
           </a:effectRef>
           <a:fontRef idx="minor">
             <a:schemeClr val="tx1"/>
@@ -3055,14 +3055,14 @@
           </a:ln>
         </p:spPr>
         <p:style>
-          <a:lnRef idx="1">
-            <a:schemeClr val="dk1"/>
+          <a:lnRef idx="3">
+            <a:schemeClr val="accent2"/>
           </a:lnRef>
           <a:fillRef idx="0">
-            <a:schemeClr val="dk1"/>
+            <a:schemeClr val="accent2"/>
           </a:fillRef>
-          <a:effectRef idx="0">
-            <a:schemeClr val="dk1"/>
+          <a:effectRef idx="2">
+            <a:schemeClr val="accent2"/>
           </a:effectRef>
           <a:fontRef idx="minor">
             <a:schemeClr val="tx1"/>
@@ -3088,14 +3088,14 @@
           </a:ln>
         </p:spPr>
         <p:style>
-          <a:lnRef idx="1">
-            <a:schemeClr val="dk1"/>
+          <a:lnRef idx="3">
+            <a:schemeClr val="accent2"/>
           </a:lnRef>
           <a:fillRef idx="0">
-            <a:schemeClr val="dk1"/>
+            <a:schemeClr val="accent2"/>
           </a:fillRef>
-          <a:effectRef idx="0">
-            <a:schemeClr val="dk1"/>
+          <a:effectRef idx="2">
+            <a:schemeClr val="accent2"/>
           </a:effectRef>
           <a:fontRef idx="minor">
             <a:schemeClr val="tx1"/>
@@ -3121,14 +3121,14 @@
           </a:ln>
         </p:spPr>
         <p:style>
-          <a:lnRef idx="1">
-            <a:schemeClr val="dk1"/>
+          <a:lnRef idx="3">
+            <a:schemeClr val="accent2"/>
           </a:lnRef>
           <a:fillRef idx="0">
-            <a:schemeClr val="dk1"/>
+            <a:schemeClr val="accent2"/>
           </a:fillRef>
-          <a:effectRef idx="0">
-            <a:schemeClr val="dk1"/>
+          <a:effectRef idx="2">
+            <a:schemeClr val="accent2"/>
           </a:effectRef>
           <a:fontRef idx="minor">
             <a:schemeClr val="tx1"/>
@@ -3154,14 +3154,14 @@
           </a:ln>
         </p:spPr>
         <p:style>
-          <a:lnRef idx="1">
-            <a:schemeClr val="dk1"/>
+          <a:lnRef idx="3">
+            <a:schemeClr val="accent2"/>
           </a:lnRef>
           <a:fillRef idx="0">
-            <a:schemeClr val="dk1"/>
+            <a:schemeClr val="accent2"/>
           </a:fillRef>
-          <a:effectRef idx="0">
-            <a:schemeClr val="dk1"/>
+          <a:effectRef idx="2">
+            <a:schemeClr val="accent2"/>
           </a:effectRef>
           <a:fontRef idx="minor">
             <a:schemeClr val="tx1"/>
@@ -3187,14 +3187,14 @@
           </a:ln>
         </p:spPr>
         <p:style>
-          <a:lnRef idx="1">
-            <a:schemeClr val="dk1"/>
+          <a:lnRef idx="3">
+            <a:schemeClr val="accent2"/>
           </a:lnRef>
           <a:fillRef idx="0">
-            <a:schemeClr val="dk1"/>
+            <a:schemeClr val="accent2"/>
           </a:fillRef>
-          <a:effectRef idx="0">
-            <a:schemeClr val="dk1"/>
+          <a:effectRef idx="2">
+            <a:schemeClr val="accent2"/>
           </a:effectRef>
           <a:fontRef idx="minor">
             <a:schemeClr val="tx1"/>
@@ -3220,14 +3220,14 @@
           </a:ln>
         </p:spPr>
         <p:style>
-          <a:lnRef idx="1">
-            <a:schemeClr val="dk1"/>
+          <a:lnRef idx="3">
+            <a:schemeClr val="accent2"/>
           </a:lnRef>
           <a:fillRef idx="0">
-            <a:schemeClr val="dk1"/>
+            <a:schemeClr val="accent2"/>
           </a:fillRef>
-          <a:effectRef idx="0">
-            <a:schemeClr val="dk1"/>
+          <a:effectRef idx="2">
+            <a:schemeClr val="accent2"/>
           </a:effectRef>
           <a:fontRef idx="minor">
             <a:schemeClr val="tx1"/>
@@ -3253,14 +3253,14 @@
           </a:ln>
         </p:spPr>
         <p:style>
-          <a:lnRef idx="1">
-            <a:schemeClr val="dk1"/>
+          <a:lnRef idx="3">
+            <a:schemeClr val="accent2"/>
           </a:lnRef>
           <a:fillRef idx="0">
-            <a:schemeClr val="dk1"/>
+            <a:schemeClr val="accent2"/>
           </a:fillRef>
-          <a:effectRef idx="0">
-            <a:schemeClr val="dk1"/>
+          <a:effectRef idx="2">
+            <a:schemeClr val="accent2"/>
           </a:effectRef>
           <a:fontRef idx="minor">
             <a:schemeClr val="tx1"/>
@@ -3286,14 +3286,14 @@
           </a:ln>
         </p:spPr>
         <p:style>
-          <a:lnRef idx="1">
-            <a:schemeClr val="dk1"/>
+          <a:lnRef idx="3">
+            <a:schemeClr val="accent2"/>
           </a:lnRef>
           <a:fillRef idx="0">
-            <a:schemeClr val="dk1"/>
+            <a:schemeClr val="accent2"/>
           </a:fillRef>
-          <a:effectRef idx="0">
-            <a:schemeClr val="dk1"/>
+          <a:effectRef idx="2">
+            <a:schemeClr val="accent2"/>
           </a:effectRef>
           <a:fontRef idx="minor">
             <a:schemeClr val="tx1"/>
@@ -3413,7 +3413,6 @@
               <a:rPr lang="en-CA" dirty="0"/>
               <a:t>5</a:t>
             </a:r>
-            <a:endParaRPr lang="en-CA" dirty="0"/>
           </a:p>
         </p:txBody>
       </p:sp>
@@ -3443,7 +3442,6 @@
               <a:rPr lang="en-CA" dirty="0"/>
               <a:t>6</a:t>
             </a:r>
-            <a:endParaRPr lang="en-CA" dirty="0"/>
           </a:p>
         </p:txBody>
       </p:sp>
@@ -3473,7 +3471,6 @@
               <a:rPr lang="en-CA" dirty="0"/>
               <a:t>7</a:t>
             </a:r>
-            <a:endParaRPr lang="en-CA" dirty="0"/>
           </a:p>
         </p:txBody>
       </p:sp>
@@ -3503,7 +3500,6 @@
               <a:rPr lang="en-CA" dirty="0"/>
               <a:t>8</a:t>
             </a:r>
-            <a:endParaRPr lang="en-CA" dirty="0"/>
           </a:p>
         </p:txBody>
       </p:sp>
@@ -3533,7 +3529,6 @@
               <a:rPr lang="en-CA" dirty="0"/>
               <a:t>9</a:t>
             </a:r>
-            <a:endParaRPr lang="en-CA" dirty="0"/>
           </a:p>
         </p:txBody>
       </p:sp>
@@ -3586,14 +3581,14 @@
           </a:ln>
         </p:spPr>
         <p:style>
-          <a:lnRef idx="1">
-            <a:schemeClr val="dk1"/>
+          <a:lnRef idx="3">
+            <a:schemeClr val="accent2"/>
           </a:lnRef>
           <a:fillRef idx="0">
-            <a:schemeClr val="dk1"/>
+            <a:schemeClr val="accent2"/>
           </a:fillRef>
-          <a:effectRef idx="0">
-            <a:schemeClr val="dk1"/>
+          <a:effectRef idx="2">
+            <a:schemeClr val="accent2"/>
           </a:effectRef>
           <a:fontRef idx="minor">
             <a:schemeClr val="tx1"/>
@@ -3648,14 +3643,14 @@
           </a:ln>
         </p:spPr>
         <p:style>
-          <a:lnRef idx="1">
-            <a:schemeClr val="dk1"/>
+          <a:lnRef idx="3">
+            <a:schemeClr val="accent2"/>
           </a:lnRef>
           <a:fillRef idx="0">
-            <a:schemeClr val="dk1"/>
+            <a:schemeClr val="accent2"/>
           </a:fillRef>
-          <a:effectRef idx="0">
-            <a:schemeClr val="dk1"/>
+          <a:effectRef idx="2">
+            <a:schemeClr val="accent2"/>
           </a:effectRef>
           <a:fontRef idx="minor">
             <a:schemeClr val="tx1"/>

</xml_diff>